<commit_message>
Finish static visualizations presentation
</commit_message>
<xml_diff>
--- a/static-visualizations.pptx
+++ b/static-visualizations.pptx
@@ -2,7 +2,7 @@
 <file path=ppt/presentation.xml><?xml version="1.0" encoding="utf-8"?>
 <p:presentation xmlns:a="http://schemas.openxmlformats.org/drawingml/2006/main" xmlns:r="http://schemas.openxmlformats.org/officeDocument/2006/relationships" xmlns:p="http://schemas.openxmlformats.org/presentationml/2006/main" autoCompressPictures="0">
   <p:sldMasterIdLst>
-    <p:sldMasterId id="2147483792" r:id="rId1"/>
+    <p:sldMasterId id="2147483804" r:id="rId1"/>
   </p:sldMasterIdLst>
   <p:sldIdLst>
     <p:sldId id="256" r:id="rId2"/>
@@ -107,11 +107,63 @@
       </a:defRPr>
     </a:lvl9pPr>
   </p:defaultTextStyle>
+  <p:extLst>
+    <p:ext uri="{EFAFB233-063F-42B5-8137-9DF3F51BA10A}">
+      <p15:sldGuideLst xmlns:p15="http://schemas.microsoft.com/office/powerpoint/2012/main"/>
+    </p:ext>
+  </p:extLst>
 </p:presentation>
 </file>
 
 <file path=ppt/changesInfos/changesInfo1.xml><?xml version="1.0" encoding="utf-8"?>
 <pc:chgInfo xmlns:a="http://schemas.openxmlformats.org/drawingml/2006/main" xmlns:r="http://schemas.openxmlformats.org/officeDocument/2006/relationships" xmlns:ac="http://schemas.microsoft.com/office/drawing/2013/main/command" xmlns:pc="http://schemas.microsoft.com/office/powerpoint/2013/main/command">
+  <pc:docChgLst>
+    <pc:chgData name="Bea Adajar" userId="c68da58217082716" providerId="LiveId" clId="{1BC2A443-AD46-4F59-B4B2-81DAA846CB5A}"/>
+    <pc:docChg chg="undo custSel modSld">
+      <pc:chgData name="Bea Adajar" userId="c68da58217082716" providerId="LiveId" clId="{1BC2A443-AD46-4F59-B4B2-81DAA846CB5A}" dt="2018-03-12T04:25:35.518" v="416" actId="20577"/>
+      <pc:docMkLst>
+        <pc:docMk/>
+      </pc:docMkLst>
+      <pc:sldChg chg="modSp">
+        <pc:chgData name="Bea Adajar" userId="c68da58217082716" providerId="LiveId" clId="{1BC2A443-AD46-4F59-B4B2-81DAA846CB5A}" dt="2018-03-12T04:06:01.782" v="148" actId="2711"/>
+        <pc:sldMkLst>
+          <pc:docMk/>
+          <pc:sldMk cId="830582588" sldId="258"/>
+        </pc:sldMkLst>
+        <pc:graphicFrameChg chg="mod modGraphic">
+          <ac:chgData name="Bea Adajar" userId="c68da58217082716" providerId="LiveId" clId="{1BC2A443-AD46-4F59-B4B2-81DAA846CB5A}" dt="2018-03-12T04:06:01.782" v="148" actId="2711"/>
+          <ac:graphicFrameMkLst>
+            <pc:docMk/>
+            <pc:sldMk cId="830582588" sldId="258"/>
+            <ac:graphicFrameMk id="16" creationId="{6473D812-739B-4571-84F4-07658A3970C4}"/>
+          </ac:graphicFrameMkLst>
+        </pc:graphicFrameChg>
+      </pc:sldChg>
+      <pc:sldChg chg="modSp">
+        <pc:chgData name="Bea Adajar" userId="c68da58217082716" providerId="LiveId" clId="{1BC2A443-AD46-4F59-B4B2-81DAA846CB5A}" dt="2018-03-12T04:25:35.518" v="416" actId="20577"/>
+        <pc:sldMkLst>
+          <pc:docMk/>
+          <pc:sldMk cId="373514500" sldId="260"/>
+        </pc:sldMkLst>
+        <pc:spChg chg="mod">
+          <ac:chgData name="Bea Adajar" userId="c68da58217082716" providerId="LiveId" clId="{1BC2A443-AD46-4F59-B4B2-81DAA846CB5A}" dt="2018-03-12T04:04:28.623" v="142" actId="20577"/>
+          <ac:spMkLst>
+            <pc:docMk/>
+            <pc:sldMk cId="373514500" sldId="260"/>
+            <ac:spMk id="2" creationId="{30E83F64-AED9-4630-8BA2-57FDCB51A380}"/>
+          </ac:spMkLst>
+        </pc:spChg>
+        <pc:spChg chg="mod">
+          <ac:chgData name="Bea Adajar" userId="c68da58217082716" providerId="LiveId" clId="{1BC2A443-AD46-4F59-B4B2-81DAA846CB5A}" dt="2018-03-12T04:25:35.518" v="416" actId="20577"/>
+          <ac:spMkLst>
+            <pc:docMk/>
+            <pc:sldMk cId="373514500" sldId="260"/>
+            <ac:spMk id="4" creationId="{C9C0FE1F-CFBD-4414-9E04-BE3E1D85FC4F}"/>
+          </ac:spMkLst>
+        </pc:spChg>
+      </pc:sldChg>
+    </pc:docChg>
+  </pc:docChgLst>
   <pc:docChgLst>
     <pc:chgData name="Bea Adajar" userId="c68da58217082716" providerId="LiveId" clId="{EEB3CC64-CC9F-4FA2-AE1B-79F4135F3A3B}"/>
     <pc:docChg chg="undo custSel addSld modSld sldOrd">
@@ -141,7 +193,7 @@
           <pc:sldMk cId="2772599017" sldId="259"/>
         </pc:sldMkLst>
         <pc:spChg chg="del">
-          <ac:chgData name="Bea Adajar" userId="c68da58217082716" providerId="LiveId" clId="{EEB3CC64-CC9F-4FA2-AE1B-79F4135F3A3B}" dt="2018-03-12T02:47:34.705" v="524"/>
+          <ac:chgData name="Bea Adajar" userId="c68da58217082716" providerId="LiveId" clId="{EEB3CC64-CC9F-4FA2-AE1B-79F4135F3A3B}" dt="2018-03-12T02:47:34.705" v="524" actId="20577"/>
           <ac:spMkLst>
             <pc:docMk/>
             <pc:sldMk cId="2772599017" sldId="259"/>
@@ -149,7 +201,7 @@
           </ac:spMkLst>
         </pc:spChg>
         <pc:spChg chg="del">
-          <ac:chgData name="Bea Adajar" userId="c68da58217082716" providerId="LiveId" clId="{EEB3CC64-CC9F-4FA2-AE1B-79F4135F3A3B}" dt="2018-03-12T02:47:34.705" v="524"/>
+          <ac:chgData name="Bea Adajar" userId="c68da58217082716" providerId="LiveId" clId="{EEB3CC64-CC9F-4FA2-AE1B-79F4135F3A3B}" dt="2018-03-12T02:47:34.705" v="524" actId="20577"/>
           <ac:spMkLst>
             <pc:docMk/>
             <pc:sldMk cId="2772599017" sldId="259"/>
@@ -213,7 +265,7 @@
 <p:sldLayout xmlns:a="http://schemas.openxmlformats.org/drawingml/2006/main" xmlns:r="http://schemas.openxmlformats.org/officeDocument/2006/relationships" xmlns:p="http://schemas.openxmlformats.org/presentationml/2006/main" showMasterSp="0" type="title" preserve="1">
   <p:cSld name="Title Slide">
     <p:bg>
-      <p:bgRef idx="1002">
+      <p:bgRef idx="1001">
         <a:schemeClr val="bg2"/>
       </p:bgRef>
     </p:bg>
@@ -239,7 +291,7 @@
         </p:nvSpPr>
         <p:spPr>
           <a:xfrm>
-            <a:off x="0" y="0"/>
+            <a:off x="1" y="0"/>
             <a:ext cx="12192000" cy="6858000"/>
           </a:xfrm>
           <a:prstGeom prst="rect">
@@ -247,7 +299,7 @@
           </a:prstGeom>
           <a:blipFill dpi="0" rotWithShape="1">
             <a:blip r:embed="rId2">
-              <a:alphaModFix amt="45000"/>
+              <a:alphaModFix amt="40000"/>
               <a:duotone>
                 <a:schemeClr val="accent1">
                   <a:shade val="45000"/>
@@ -257,7 +309,7 @@
               </a:duotone>
             </a:blip>
             <a:srcRect/>
-            <a:tile tx="-44450" ty="38100" sx="85000" sy="85000" flip="none" algn="tl"/>
+            <a:tile tx="-133350" ty="330200" sx="85000" sy="85000" flip="xy" algn="tl"/>
           </a:blipFill>
           <a:ln>
             <a:noFill/>
@@ -354,7 +406,7 @@
             <a:avLst/>
           </a:prstGeom>
           <a:solidFill>
-            <a:schemeClr val="bg2"/>
+            <a:schemeClr val="accent1"/>
           </a:solidFill>
           <a:ln>
             <a:noFill/>
@@ -413,7 +465,10 @@
             </a:solidFill>
             <a:ln>
               <a:solidFill>
-                <a:schemeClr val="tx1"/>
+                <a:schemeClr val="tx1">
+                  <a:lumMod val="85000"/>
+                  <a:lumOff val="15000"/>
+                </a:schemeClr>
               </a:solidFill>
               <a:miter lim="800000"/>
             </a:ln>
@@ -455,7 +510,10 @@
             </a:solidFill>
             <a:ln>
               <a:solidFill>
-                <a:schemeClr val="tx1"/>
+                <a:schemeClr val="tx1">
+                  <a:lumMod val="85000"/>
+                  <a:lumOff val="15000"/>
+                </a:schemeClr>
               </a:solidFill>
               <a:miter lim="800000"/>
             </a:ln>
@@ -497,7 +555,10 @@
             </a:solidFill>
             <a:ln>
               <a:solidFill>
-                <a:schemeClr val="tx1"/>
+                <a:schemeClr val="tx1">
+                  <a:lumMod val="85000"/>
+                  <a:lumOff val="15000"/>
+                </a:schemeClr>
               </a:solidFill>
               <a:miter lim="800000"/>
             </a:ln>
@@ -594,7 +655,9 @@
               <a:buNone/>
               <a:defRPr sz="1600" spc="80" baseline="0">
                 <a:solidFill>
-                  <a:schemeClr val="tx1"/>
+                  <a:schemeClr val="tx2">
+                    <a:lumMod val="75000"/>
+                  </a:schemeClr>
                 </a:solidFill>
               </a:defRPr>
             </a:lvl1pPr>
@@ -662,7 +725,7 @@
             <a:lvl1pPr algn="ctr">
               <a:defRPr sz="1300" spc="0" baseline="0">
                 <a:solidFill>
-                  <a:schemeClr val="tx1"/>
+                  <a:srgbClr val="FFFFFF"/>
                 </a:solidFill>
                 <a:latin typeface="+mn-lt"/>
               </a:defRPr>
@@ -689,7 +752,7 @@
         </p:nvSpPr>
         <p:spPr>
           <a:xfrm>
-            <a:off x="1453896" y="5211060"/>
+            <a:off x="1453896" y="5212080"/>
             <a:ext cx="5905500" cy="228600"/>
           </a:xfrm>
         </p:spPr>
@@ -755,7 +818,7 @@
     </p:spTree>
     <p:extLst>
       <p:ext uri="{BB962C8B-B14F-4D97-AF65-F5344CB8AC3E}">
-        <p14:creationId xmlns:p14="http://schemas.microsoft.com/office/powerpoint/2010/main" val="50217800"/>
+        <p14:creationId xmlns:p14="http://schemas.microsoft.com/office/powerpoint/2010/main" val="80968373"/>
       </p:ext>
     </p:extLst>
   </p:cSld>
@@ -927,7 +990,7 @@
     </p:spTree>
     <p:extLst>
       <p:ext uri="{BB962C8B-B14F-4D97-AF65-F5344CB8AC3E}">
-        <p14:creationId xmlns:p14="http://schemas.microsoft.com/office/powerpoint/2010/main" val="1539666184"/>
+        <p14:creationId xmlns:p14="http://schemas.microsoft.com/office/powerpoint/2010/main" val="147414269"/>
       </p:ext>
     </p:extLst>
   </p:cSld>
@@ -1109,7 +1172,7 @@
     </p:spTree>
     <p:extLst>
       <p:ext uri="{BB962C8B-B14F-4D97-AF65-F5344CB8AC3E}">
-        <p14:creationId xmlns:p14="http://schemas.microsoft.com/office/powerpoint/2010/main" val="657890093"/>
+        <p14:creationId xmlns:p14="http://schemas.microsoft.com/office/powerpoint/2010/main" val="1520233338"/>
       </p:ext>
     </p:extLst>
   </p:cSld>
@@ -1213,7 +1276,7 @@
       </p:sp>
       <p:sp>
         <p:nvSpPr>
-          <p:cNvPr id="7" name="Date Placeholder 6"/>
+          <p:cNvPr id="4" name="Date Placeholder 3"/>
           <p:cNvSpPr>
             <a:spLocks noGrp="1"/>
           </p:cNvSpPr>
@@ -1237,7 +1300,7 @@
       </p:sp>
       <p:sp>
         <p:nvSpPr>
-          <p:cNvPr id="8" name="Footer Placeholder 7"/>
+          <p:cNvPr id="5" name="Footer Placeholder 4"/>
           <p:cNvSpPr>
             <a:spLocks noGrp="1"/>
           </p:cNvSpPr>
@@ -1256,7 +1319,7 @@
       </p:sp>
       <p:sp>
         <p:nvSpPr>
-          <p:cNvPr id="9" name="Slide Number Placeholder 8"/>
+          <p:cNvPr id="6" name="Slide Number Placeholder 5"/>
           <p:cNvSpPr>
             <a:spLocks noGrp="1"/>
           </p:cNvSpPr>
@@ -1281,7 +1344,7 @@
     </p:spTree>
     <p:extLst>
       <p:ext uri="{BB962C8B-B14F-4D97-AF65-F5344CB8AC3E}">
-        <p14:creationId xmlns:p14="http://schemas.microsoft.com/office/powerpoint/2010/main" val="145593239"/>
+        <p14:creationId xmlns:p14="http://schemas.microsoft.com/office/powerpoint/2010/main" val="501697201"/>
       </p:ext>
     </p:extLst>
   </p:cSld>
@@ -1295,7 +1358,7 @@
 <p:sldLayout xmlns:a="http://schemas.openxmlformats.org/drawingml/2006/main" xmlns:r="http://schemas.openxmlformats.org/officeDocument/2006/relationships" xmlns:p="http://schemas.openxmlformats.org/presentationml/2006/main" showMasterSp="0" type="secHead" preserve="1">
   <p:cSld name="Section Header">
     <p:bg>
-      <p:bgRef idx="1002">
+      <p:bgRef idx="1001">
         <a:schemeClr val="bg2"/>
       </p:bgRef>
     </p:bg>
@@ -1315,13 +1378,13 @@
       </p:grpSpPr>
       <p:sp>
         <p:nvSpPr>
-          <p:cNvPr id="22" name="Rectangle 21"/>
+          <p:cNvPr id="16" name="Rectangle 15"/>
           <p:cNvSpPr/>
           <p:nvPr/>
         </p:nvSpPr>
         <p:spPr>
           <a:xfrm>
-            <a:off x="0" y="0"/>
+            <a:off x="11784" y="0"/>
             <a:ext cx="12192000" cy="6858000"/>
           </a:xfrm>
           <a:prstGeom prst="rect">
@@ -1329,7 +1392,7 @@
           </a:prstGeom>
           <a:blipFill dpi="0" rotWithShape="1">
             <a:blip r:embed="rId2">
-              <a:alphaModFix amt="45000"/>
+              <a:alphaModFix amt="40000"/>
               <a:duotone>
                 <a:schemeClr val="accent2">
                   <a:shade val="45000"/>
@@ -1339,7 +1402,7 @@
               </a:duotone>
             </a:blip>
             <a:srcRect/>
-            <a:tile tx="-44450" ty="38100" sx="85000" sy="85000" flip="none" algn="tl"/>
+            <a:tile tx="-133350" ty="330200" sx="85000" sy="85000" flip="xy" algn="tl"/>
           </a:blipFill>
           <a:ln>
             <a:noFill/>
@@ -1401,7 +1464,7 @@
         </p:nvSpPr>
         <p:spPr>
           <a:xfrm>
-            <a:off x="1447800" y="1411615"/>
+            <a:off x="1447801" y="1411615"/>
             <a:ext cx="9296400" cy="4034770"/>
           </a:xfrm>
           <a:prstGeom prst="rect">
@@ -1436,7 +1499,7 @@
             <a:avLst/>
           </a:prstGeom>
           <a:solidFill>
-            <a:schemeClr val="bg2"/>
+            <a:schemeClr val="accent2"/>
           </a:solidFill>
           <a:ln>
             <a:noFill/>
@@ -1495,7 +1558,9 @@
             </a:solidFill>
             <a:ln>
               <a:solidFill>
-                <a:schemeClr val="tx1"/>
+                <a:schemeClr val="accent2">
+                  <a:lumMod val="50000"/>
+                </a:schemeClr>
               </a:solidFill>
               <a:miter lim="800000"/>
             </a:ln>
@@ -1537,7 +1602,9 @@
             </a:solidFill>
             <a:ln>
               <a:solidFill>
-                <a:schemeClr val="tx1"/>
+                <a:schemeClr val="accent2">
+                  <a:lumMod val="50000"/>
+                </a:schemeClr>
               </a:solidFill>
               <a:miter lim="800000"/>
             </a:ln>
@@ -1579,7 +1646,9 @@
             </a:solidFill>
             <a:ln>
               <a:solidFill>
-                <a:schemeClr val="tx1"/>
+                <a:schemeClr val="accent2">
+                  <a:lumMod val="50000"/>
+                </a:schemeClr>
               </a:solidFill>
               <a:miter lim="800000"/>
             </a:ln>
@@ -1671,9 +1740,12 @@
           <a:lstStyle>
             <a:lvl1pPr marL="0" indent="0" algn="ctr">
               <a:buNone/>
+              <a:tabLst>
+                <a:tab pos="2633663" algn="l"/>
+              </a:tabLst>
               <a:defRPr sz="1600">
                 <a:solidFill>
-                  <a:schemeClr val="tx1"/>
+                  <a:schemeClr val="tx2"/>
                 </a:solidFill>
                 <a:effectLst/>
               </a:defRPr>
@@ -1790,7 +1862,7 @@
             <a:lvl1pPr algn="ctr">
               <a:defRPr lang="en-US" sz="1300" kern="1200" spc="0" baseline="0">
                 <a:solidFill>
-                  <a:schemeClr val="tx1"/>
+                  <a:srgbClr val="FFFFFF"/>
                 </a:solidFill>
                 <a:latin typeface="+mn-lt"/>
                 <a:ea typeface="+mn-ea"/>
@@ -1819,7 +1891,7 @@
         </p:nvSpPr>
         <p:spPr>
           <a:xfrm>
-            <a:off x="1453553" y="5211060"/>
+            <a:off x="1453896" y="5212080"/>
             <a:ext cx="5907024" cy="228600"/>
           </a:xfrm>
         </p:spPr>
@@ -1847,7 +1919,7 @@
         </p:nvSpPr>
         <p:spPr>
           <a:xfrm>
-            <a:off x="8604504" y="5211060"/>
+            <a:off x="8604504" y="5212080"/>
             <a:ext cx="2112264" cy="228600"/>
           </a:xfrm>
         </p:spPr>
@@ -1867,7 +1939,7 @@
     </p:spTree>
     <p:extLst>
       <p:ext uri="{BB962C8B-B14F-4D97-AF65-F5344CB8AC3E}">
-        <p14:creationId xmlns:p14="http://schemas.microsoft.com/office/powerpoint/2010/main" val="2966425025"/>
+        <p14:creationId xmlns:p14="http://schemas.microsoft.com/office/powerpoint/2010/main" val="2950752255"/>
       </p:ext>
     </p:extLst>
   </p:cSld>
@@ -2157,7 +2229,7 @@
     </p:spTree>
     <p:extLst>
       <p:ext uri="{BB962C8B-B14F-4D97-AF65-F5344CB8AC3E}">
-        <p14:creationId xmlns:p14="http://schemas.microsoft.com/office/powerpoint/2010/main" val="2453313386"/>
+        <p14:creationId xmlns:p14="http://schemas.microsoft.com/office/powerpoint/2010/main" val="555744368"/>
       </p:ext>
     </p:extLst>
   </p:cSld>
@@ -2233,7 +2305,7 @@
                 <a:spcPts val="0"/>
               </a:spcBef>
               <a:buNone/>
-              <a:defRPr sz="1900" b="0">
+              <a:defRPr sz="1800" b="0">
                 <a:solidFill>
                   <a:schemeClr val="tx2"/>
                 </a:solidFill>
@@ -2242,7 +2314,7 @@
             </a:lvl1pPr>
             <a:lvl2pPr marL="457200" indent="0">
               <a:buNone/>
-              <a:defRPr sz="1900" b="1"/>
+              <a:defRPr sz="1800" b="1"/>
             </a:lvl2pPr>
             <a:lvl3pPr marL="914400" indent="0">
               <a:buNone/>
@@ -2393,7 +2465,7 @@
                 <a:spcPts val="0"/>
               </a:spcBef>
               <a:buNone/>
-              <a:defRPr sz="1900" b="0">
+              <a:defRPr sz="1800" b="0">
                 <a:solidFill>
                   <a:schemeClr val="tx2"/>
                 </a:solidFill>
@@ -2401,7 +2473,7 @@
             </a:lvl1pPr>
             <a:lvl2pPr marL="457200" indent="0">
               <a:buNone/>
-              <a:defRPr sz="1900" b="1"/>
+              <a:defRPr sz="1800" b="1"/>
             </a:lvl2pPr>
             <a:lvl3pPr marL="914400" indent="0">
               <a:buNone/>
@@ -2596,7 +2668,7 @@
     </p:spTree>
     <p:extLst>
       <p:ext uri="{BB962C8B-B14F-4D97-AF65-F5344CB8AC3E}">
-        <p14:creationId xmlns:p14="http://schemas.microsoft.com/office/powerpoint/2010/main" val="260813451"/>
+        <p14:creationId xmlns:p14="http://schemas.microsoft.com/office/powerpoint/2010/main" val="1088776200"/>
       </p:ext>
     </p:extLst>
   </p:cSld>
@@ -2716,7 +2788,7 @@
     </p:spTree>
     <p:extLst>
       <p:ext uri="{BB962C8B-B14F-4D97-AF65-F5344CB8AC3E}">
-        <p14:creationId xmlns:p14="http://schemas.microsoft.com/office/powerpoint/2010/main" val="2552766752"/>
+        <p14:creationId xmlns:p14="http://schemas.microsoft.com/office/powerpoint/2010/main" val="2728600224"/>
       </p:ext>
     </p:extLst>
   </p:cSld>
@@ -2813,7 +2885,7 @@
     </p:spTree>
     <p:extLst>
       <p:ext uri="{BB962C8B-B14F-4D97-AF65-F5344CB8AC3E}">
-        <p14:creationId xmlns:p14="http://schemas.microsoft.com/office/powerpoint/2010/main" val="3075361954"/>
+        <p14:creationId xmlns:p14="http://schemas.microsoft.com/office/powerpoint/2010/main" val="423642860"/>
       </p:ext>
     </p:extLst>
   </p:cSld>
@@ -2842,14 +2914,14 @@
       </p:grpSpPr>
       <p:sp>
         <p:nvSpPr>
-          <p:cNvPr id="16" name="Rectangle 15"/>
+          <p:cNvPr id="15" name="Rectangle 14"/>
           <p:cNvSpPr/>
           <p:nvPr/>
         </p:nvSpPr>
         <p:spPr>
           <a:xfrm>
-            <a:off x="245529" y="237744"/>
-            <a:ext cx="8531352" cy="6382512"/>
+            <a:off x="9020386" y="237744"/>
+            <a:ext cx="2926080" cy="6382512"/>
           </a:xfrm>
           <a:prstGeom prst="rect">
             <a:avLst/>
@@ -2880,44 +2952,6 @@
       </p:sp>
       <p:sp>
         <p:nvSpPr>
-          <p:cNvPr id="15" name="Rectangle 14"/>
-          <p:cNvSpPr/>
-          <p:nvPr/>
-        </p:nvSpPr>
-        <p:spPr>
-          <a:xfrm>
-            <a:off x="9020386" y="237744"/>
-            <a:ext cx="2926080" cy="6382512"/>
-          </a:xfrm>
-          <a:prstGeom prst="rect">
-            <a:avLst/>
-          </a:prstGeom>
-          <a:solidFill>
-            <a:schemeClr val="accent1"/>
-          </a:solidFill>
-          <a:ln>
-            <a:noFill/>
-          </a:ln>
-        </p:spPr>
-        <p:style>
-          <a:lnRef idx="2">
-            <a:schemeClr val="accent1">
-              <a:shade val="50000"/>
-            </a:schemeClr>
-          </a:lnRef>
-          <a:fillRef idx="1">
-            <a:schemeClr val="accent1"/>
-          </a:fillRef>
-          <a:effectRef idx="0">
-            <a:schemeClr val="accent1"/>
-          </a:effectRef>
-          <a:fontRef idx="minor">
-            <a:schemeClr val="lt1"/>
-          </a:fontRef>
-        </p:style>
-      </p:sp>
-      <p:sp>
-        <p:nvSpPr>
           <p:cNvPr id="2" name="Title 1"/>
           <p:cNvSpPr>
             <a:spLocks noGrp="1"/>
@@ -2947,7 +2981,7 @@
               <a:buNone/>
               <a:defRPr lang="en-US" sz="2800" b="0" kern="1200" cap="none" spc="0" baseline="0" dirty="0">
                 <a:solidFill>
-                  <a:srgbClr val="FFFFFF"/>
+                  <a:schemeClr val="tx1"/>
                 </a:solidFill>
                 <a:effectLst/>
                 <a:latin typeface="+mj-lt"/>
@@ -2985,7 +3019,7 @@
           <a:bodyPr/>
           <a:lstStyle>
             <a:lvl1pPr>
-              <a:defRPr sz="1800"/>
+              <a:defRPr sz="1900"/>
             </a:lvl1pPr>
             <a:lvl2pPr>
               <a:defRPr sz="1600"/>
@@ -3081,7 +3115,7 @@
               <a:buNone/>
               <a:defRPr sz="1400">
                 <a:solidFill>
-                  <a:srgbClr val="FFFFFF"/>
+                  <a:schemeClr val="tx1"/>
                 </a:solidFill>
               </a:defRPr>
             </a:lvl1pPr>
@@ -3186,21 +3220,13 @@
         </p:nvSpPr>
         <p:spPr>
           <a:xfrm>
-            <a:off x="10393677" y="6223002"/>
-            <a:ext cx="1463040" cy="274320"/>
+            <a:off x="10396728" y="6227064"/>
+            <a:ext cx="1463040" cy="256032"/>
           </a:xfrm>
         </p:spPr>
         <p:txBody>
           <a:bodyPr/>
-          <a:lstStyle>
-            <a:lvl1pPr>
-              <a:defRPr>
-                <a:solidFill>
-                  <a:srgbClr val="FFFFFF"/>
-                </a:solidFill>
-              </a:defRPr>
-            </a:lvl1pPr>
-          </a:lstStyle>
+          <a:lstStyle/>
           <a:p>
             <a:fld id="{4FAB73BC-B049-4115-A692-8D63A059BFB8}" type="slidenum">
               <a:rPr lang="en-US" smtClean="0"/>
@@ -3228,7 +3254,10 @@
           <a:noFill/>
           <a:ln w="6350" cap="sq">
             <a:solidFill>
-              <a:srgbClr val="FFFFFF"/>
+              <a:schemeClr val="tx1">
+                <a:lumMod val="75000"/>
+                <a:lumOff val="25000"/>
+              </a:schemeClr>
             </a:solidFill>
             <a:miter lim="800000"/>
           </a:ln>
@@ -3253,7 +3282,7 @@
     </p:spTree>
     <p:extLst>
       <p:ext uri="{BB962C8B-B14F-4D97-AF65-F5344CB8AC3E}">
-        <p14:creationId xmlns:p14="http://schemas.microsoft.com/office/powerpoint/2010/main" val="4156961428"/>
+        <p14:creationId xmlns:p14="http://schemas.microsoft.com/office/powerpoint/2010/main" val="2721410107"/>
       </p:ext>
     </p:extLst>
   </p:cSld>
@@ -3295,7 +3324,7 @@
             <a:avLst/>
           </a:prstGeom>
           <a:solidFill>
-            <a:schemeClr val="accent1"/>
+            <a:schemeClr val="bg2"/>
           </a:solidFill>
           <a:ln>
             <a:noFill/>
@@ -3342,7 +3371,7 @@
             <a:lvl1pPr algn="l">
               <a:defRPr sz="2800" b="0">
                 <a:solidFill>
-                  <a:srgbClr val="FFFFFF"/>
+                  <a:schemeClr val="tx1"/>
                 </a:solidFill>
                 <a:latin typeface="+mj-lt"/>
               </a:defRPr>
@@ -3373,7 +3402,7 @@
             <a:ext cx="8531352" cy="6382512"/>
           </a:xfrm>
           <a:solidFill>
-            <a:schemeClr val="accent1">
+            <a:schemeClr val="accent6">
               <a:lumMod val="60000"/>
               <a:lumOff val="40000"/>
             </a:schemeClr>
@@ -3462,7 +3491,7 @@
               <a:buNone/>
               <a:defRPr sz="1400">
                 <a:solidFill>
-                  <a:srgbClr val="FFFFFF"/>
+                  <a:schemeClr val="tx1"/>
                 </a:solidFill>
               </a:defRPr>
             </a:lvl1pPr>
@@ -3528,7 +3557,7 @@
                   <a:srgbClr val="FFFFFF"/>
                 </a:solidFill>
                 <a:effectLst>
-                  <a:outerShdw blurRad="12700" dist="6350" dir="2700000" algn="tl" rotWithShape="0">
+                  <a:outerShdw blurRad="19050" dist="6350" dir="2700000" algn="tl" rotWithShape="0">
                     <a:prstClr val="black">
                       <a:alpha val="40000"/>
                     </a:prstClr>
@@ -3566,7 +3595,7 @@
                   <a:srgbClr val="FFFFFF"/>
                 </a:solidFill>
                 <a:effectLst>
-                  <a:outerShdw blurRad="12700" dist="6350" dir="2700000" algn="tl" rotWithShape="0">
+                  <a:outerShdw blurRad="19050" dist="6350" dir="2700000" algn="tl" rotWithShape="0">
                     <a:prstClr val="black">
                       <a:alpha val="40000"/>
                     </a:prstClr>
@@ -3596,20 +3625,12 @@
         <p:spPr>
           <a:xfrm>
             <a:off x="10396728" y="6227064"/>
-            <a:ext cx="1463040" cy="274320"/>
+            <a:ext cx="1463040" cy="256032"/>
           </a:xfrm>
         </p:spPr>
         <p:txBody>
           <a:bodyPr/>
-          <a:lstStyle>
-            <a:lvl1pPr>
-              <a:defRPr>
-                <a:solidFill>
-                  <a:srgbClr val="FFFFFF"/>
-                </a:solidFill>
-              </a:defRPr>
-            </a:lvl1pPr>
-          </a:lstStyle>
+          <a:lstStyle/>
           <a:p>
             <a:fld id="{4FAB73BC-B049-4115-A692-8D63A059BFB8}" type="slidenum">
               <a:rPr lang="en-US" smtClean="0"/>
@@ -3637,7 +3658,10 @@
           <a:noFill/>
           <a:ln w="6350" cap="sq">
             <a:solidFill>
-              <a:srgbClr val="FFFFFF"/>
+              <a:schemeClr val="tx1">
+                <a:lumMod val="75000"/>
+                <a:lumOff val="25000"/>
+              </a:schemeClr>
             </a:solidFill>
             <a:miter lim="800000"/>
           </a:ln>
@@ -3662,7 +3686,7 @@
     </p:spTree>
     <p:extLst>
       <p:ext uri="{BB962C8B-B14F-4D97-AF65-F5344CB8AC3E}">
-        <p14:creationId xmlns:p14="http://schemas.microsoft.com/office/powerpoint/2010/main" val="2216159181"/>
+        <p14:creationId xmlns:p14="http://schemas.microsoft.com/office/powerpoint/2010/main" val="1238649797"/>
       </p:ext>
     </p:extLst>
   </p:cSld>
@@ -3830,8 +3854,8 @@
         </p:nvSpPr>
         <p:spPr>
           <a:xfrm>
-            <a:off x="274320" y="6307672"/>
-            <a:ext cx="2743200" cy="274320"/>
+            <a:off x="389464" y="6214535"/>
+            <a:ext cx="2743200" cy="256032"/>
           </a:xfrm>
           <a:prstGeom prst="rect">
             <a:avLst/>
@@ -3872,8 +3896,8 @@
         </p:nvSpPr>
         <p:spPr>
           <a:xfrm>
-            <a:off x="3489960" y="6307672"/>
-            <a:ext cx="5212080" cy="274320"/>
+            <a:off x="3489960" y="6214535"/>
+            <a:ext cx="5212080" cy="256032"/>
           </a:xfrm>
           <a:prstGeom prst="rect">
             <a:avLst/>
@@ -3910,8 +3934,8 @@
         </p:nvSpPr>
         <p:spPr>
           <a:xfrm>
-            <a:off x="10469880" y="6307672"/>
-            <a:ext cx="1463040" cy="274320"/>
+            <a:off x="10348535" y="6214535"/>
+            <a:ext cx="1463040" cy="256032"/>
           </a:xfrm>
           <a:prstGeom prst="rect">
             <a:avLst/>
@@ -3941,26 +3965,54 @@
           </a:p>
         </p:txBody>
       </p:sp>
+      <p:sp>
+        <p:nvSpPr>
+          <p:cNvPr id="8" name="Rectangle 7"/>
+          <p:cNvSpPr/>
+          <p:nvPr/>
+        </p:nvSpPr>
+        <p:spPr>
+          <a:xfrm>
+            <a:off x="371856" y="374904"/>
+            <a:ext cx="11448288" cy="6108192"/>
+          </a:xfrm>
+          <a:prstGeom prst="rect">
+            <a:avLst/>
+          </a:prstGeom>
+          <a:noFill/>
+          <a:ln w="6350" cap="sq" cmpd="sng" algn="ctr">
+            <a:solidFill>
+              <a:schemeClr val="tx1">
+                <a:lumMod val="75000"/>
+                <a:lumOff val="25000"/>
+              </a:schemeClr>
+            </a:solidFill>
+            <a:prstDash val="solid"/>
+            <a:miter lim="800000"/>
+          </a:ln>
+          <a:effectLst/>
+        </p:spPr>
+      </p:sp>
     </p:spTree>
     <p:extLst>
       <p:ext uri="{BB962C8B-B14F-4D97-AF65-F5344CB8AC3E}">
-        <p14:creationId xmlns:p14="http://schemas.microsoft.com/office/powerpoint/2010/main" val="1122518799"/>
+        <p14:creationId xmlns:p14="http://schemas.microsoft.com/office/powerpoint/2010/main" val="1566900398"/>
       </p:ext>
     </p:extLst>
   </p:cSld>
   <p:clrMap bg1="lt1" tx1="dk1" bg2="lt2" tx2="dk2" accent1="accent1" accent2="accent2" accent3="accent3" accent4="accent4" accent5="accent5" accent6="accent6" hlink="hlink" folHlink="folHlink"/>
   <p:sldLayoutIdLst>
-    <p:sldLayoutId id="2147483793" r:id="rId1"/>
-    <p:sldLayoutId id="2147483794" r:id="rId2"/>
-    <p:sldLayoutId id="2147483795" r:id="rId3"/>
-    <p:sldLayoutId id="2147483796" r:id="rId4"/>
-    <p:sldLayoutId id="2147483797" r:id="rId5"/>
-    <p:sldLayoutId id="2147483798" r:id="rId6"/>
-    <p:sldLayoutId id="2147483799" r:id="rId7"/>
-    <p:sldLayoutId id="2147483800" r:id="rId8"/>
-    <p:sldLayoutId id="2147483801" r:id="rId9"/>
-    <p:sldLayoutId id="2147483802" r:id="rId10"/>
-    <p:sldLayoutId id="2147483803" r:id="rId11"/>
+    <p:sldLayoutId id="2147483805" r:id="rId1"/>
+    <p:sldLayoutId id="2147483806" r:id="rId2"/>
+    <p:sldLayoutId id="2147483807" r:id="rId3"/>
+    <p:sldLayoutId id="2147483808" r:id="rId4"/>
+    <p:sldLayoutId id="2147483809" r:id="rId5"/>
+    <p:sldLayoutId id="2147483810" r:id="rId6"/>
+    <p:sldLayoutId id="2147483811" r:id="rId7"/>
+    <p:sldLayoutId id="2147483812" r:id="rId8"/>
+    <p:sldLayoutId id="2147483813" r:id="rId9"/>
+    <p:sldLayoutId id="2147483814" r:id="rId10"/>
+    <p:sldLayoutId id="2147483815" r:id="rId11"/>
   </p:sldLayoutIdLst>
   <p:hf sldNum="0" hdr="0" ftr="0" dt="0"/>
   <p:txStyles>
@@ -4523,7 +4575,7 @@
             <p:ph idx="1"/>
             <p:extLst>
               <p:ext uri="{D42A27DB-BD31-4B8C-83A1-F6EECF244321}">
-                <p14:modId xmlns:p14="http://schemas.microsoft.com/office/powerpoint/2010/main" val="2981700391"/>
+                <p14:modId xmlns:p14="http://schemas.microsoft.com/office/powerpoint/2010/main" val="1533763125"/>
               </p:ext>
             </p:extLst>
           </p:nvPr>
@@ -5129,7 +5181,7 @@
                 <a:ea typeface="Open Sans" panose="020B0606030504020204" pitchFamily="34" charset="0"/>
                 <a:cs typeface="Open Sans" panose="020B0606030504020204" pitchFamily="34" charset="0"/>
               </a:rPr>
-              <a:t>Findings</a:t>
+              <a:t>Current Findings</a:t>
             </a:r>
           </a:p>
         </p:txBody>
@@ -5165,7 +5217,7 @@
                 <a:ea typeface="Open Sans" panose="020B0606030504020204" pitchFamily="34" charset="0"/>
                 <a:cs typeface="Open Sans" panose="020B0606030504020204" pitchFamily="34" charset="0"/>
               </a:rPr>
-              <a:t>---</a:t>
+              <a:t>The outlier articles with the most number of shares and reactions from these fake news sites are not actually classified as “fake news.”</a:t>
             </a:r>
           </a:p>
           <a:p>
@@ -5173,6 +5225,14 @@
               <a:buFont typeface="+mj-lt"/>
               <a:buAutoNum type="arabicPeriod"/>
             </a:pPr>
+            <a:r>
+              <a:rPr lang="en-US" dirty="0">
+                <a:latin typeface="Open Sans" panose="020B0606030504020204" pitchFamily="34" charset="0"/>
+                <a:ea typeface="Open Sans" panose="020B0606030504020204" pitchFamily="34" charset="0"/>
+                <a:cs typeface="Open Sans" panose="020B0606030504020204" pitchFamily="34" charset="0"/>
+              </a:rPr>
+              <a:t>All these outliers are published by the same page, </a:t>
+            </a:r>
             <a:r>
               <a:rPr lang="en-US" dirty="0" err="1">
                 <a:latin typeface="Open Sans" panose="020B0606030504020204" pitchFamily="34" charset="0"/>
@@ -5182,6 +5242,33 @@
               <a:t>i.am.filipino</a:t>
             </a:r>
             <a:r>
+              <a:rPr lang="en-US">
+                <a:latin typeface="Open Sans" panose="020B0606030504020204" pitchFamily="34" charset="0"/>
+                <a:ea typeface="Open Sans" panose="020B0606030504020204" pitchFamily="34" charset="0"/>
+                <a:cs typeface="Open Sans" panose="020B0606030504020204" pitchFamily="34" charset="0"/>
+              </a:rPr>
+              <a:t>.</a:t>
+            </a:r>
+            <a:endParaRPr lang="en-US" dirty="0">
+              <a:latin typeface="Open Sans" panose="020B0606030504020204" pitchFamily="34" charset="0"/>
+              <a:ea typeface="Open Sans" panose="020B0606030504020204" pitchFamily="34" charset="0"/>
+              <a:cs typeface="Open Sans" panose="020B0606030504020204" pitchFamily="34" charset="0"/>
+            </a:endParaRPr>
+          </a:p>
+          <a:p>
+            <a:pPr marL="342900" indent="-342900">
+              <a:buFont typeface="+mj-lt"/>
+              <a:buAutoNum type="arabicPeriod"/>
+            </a:pPr>
+            <a:r>
+              <a:rPr lang="en-US" dirty="0" err="1">
+                <a:latin typeface="Open Sans" panose="020B0606030504020204" pitchFamily="34" charset="0"/>
+                <a:ea typeface="Open Sans" panose="020B0606030504020204" pitchFamily="34" charset="0"/>
+                <a:cs typeface="Open Sans" panose="020B0606030504020204" pitchFamily="34" charset="0"/>
+              </a:rPr>
+              <a:t>i.am.filipino</a:t>
+            </a:r>
+            <a:r>
               <a:rPr lang="en-US" dirty="0">
                 <a:latin typeface="Open Sans" panose="020B0606030504020204" pitchFamily="34" charset="0"/>
                 <a:ea typeface="Open Sans" panose="020B0606030504020204" pitchFamily="34" charset="0"/>
@@ -5229,27 +5316,22 @@
                 <a:ea typeface="Open Sans" panose="020B0606030504020204" pitchFamily="34" charset="0"/>
                 <a:cs typeface="Open Sans" panose="020B0606030504020204" pitchFamily="34" charset="0"/>
               </a:rPr>
-              <a:t>In some cases, words that are more frequently used do not necessarily appear in </a:t>
-            </a:r>
-            <a:r>
-              <a:rPr lang="en-US">
+              <a:t>Most of the top frequently-used words are related to politics and crimes.</a:t>
+            </a:r>
+          </a:p>
+          <a:p>
+            <a:pPr marL="342900" indent="-342900">
+              <a:buFont typeface="+mj-lt"/>
+              <a:buAutoNum type="arabicPeriod"/>
+            </a:pPr>
+            <a:r>
+              <a:rPr lang="en-US" dirty="0">
                 <a:latin typeface="Open Sans" panose="020B0606030504020204" pitchFamily="34" charset="0"/>
                 <a:ea typeface="Open Sans" panose="020B0606030504020204" pitchFamily="34" charset="0"/>
                 <a:cs typeface="Open Sans" panose="020B0606030504020204" pitchFamily="34" charset="0"/>
               </a:rPr>
-              <a:t>more posts.</a:t>
-            </a:r>
-          </a:p>
-          <a:p>
-            <a:pPr marL="342900" indent="-342900">
-              <a:buFont typeface="+mj-lt"/>
-              <a:buAutoNum type="arabicPeriod"/>
-            </a:pPr>
-            <a:endParaRPr lang="en-US" dirty="0">
-              <a:latin typeface="Open Sans" panose="020B0606030504020204" pitchFamily="34" charset="0"/>
-              <a:ea typeface="Open Sans" panose="020B0606030504020204" pitchFamily="34" charset="0"/>
-              <a:cs typeface="Open Sans" panose="020B0606030504020204" pitchFamily="34" charset="0"/>
-            </a:endParaRPr>
+              <a:t>In some cases, words that are more frequently used do not necessarily appear in more posts.</a:t>
+            </a:r>
           </a:p>
         </p:txBody>
       </p:sp>
@@ -5277,39 +5359,39 @@
         <a:sysClr val="window" lastClr="FFFFFF"/>
       </a:lt1>
       <a:dk2>
-        <a:srgbClr val="1485A4"/>
+        <a:srgbClr val="736059"/>
       </a:dk2>
       <a:lt2>
-        <a:srgbClr val="E3DED1"/>
+        <a:srgbClr val="E7E0C7"/>
       </a:lt2>
       <a:accent1>
-        <a:srgbClr val="1CADE4"/>
+        <a:srgbClr val="92B0C8"/>
       </a:accent1>
       <a:accent2>
-        <a:srgbClr val="2683C6"/>
+        <a:srgbClr val="E37C3D"/>
       </a:accent2>
       <a:accent3>
-        <a:srgbClr val="27CED7"/>
+        <a:srgbClr val="A5AB81"/>
       </a:accent3>
       <a:accent4>
-        <a:srgbClr val="42BA97"/>
+        <a:srgbClr val="E9B635"/>
       </a:accent4>
       <a:accent5>
-        <a:srgbClr val="3E8853"/>
+        <a:srgbClr val="7BA79D"/>
       </a:accent5>
       <a:accent6>
-        <a:srgbClr val="62A39F"/>
+        <a:srgbClr val="968C8C"/>
       </a:accent6>
       <a:hlink>
-        <a:srgbClr val="F49100"/>
+        <a:srgbClr val="F7A115"/>
       </a:hlink>
       <a:folHlink>
-        <a:srgbClr val="739D9B"/>
+        <a:srgbClr val="969696"/>
       </a:folHlink>
     </a:clrScheme>
     <a:fontScheme name="Savon">
       <a:majorFont>
-        <a:latin typeface="Century Gothic" panose="020B0502020202020204"/>
+        <a:latin typeface="Garamond" panose="02020404030301010803"/>
         <a:ea typeface=""/>
         <a:cs typeface=""/>
         <a:font script="Jpan" typeface="ＭＳ ゴシック"/>
@@ -5344,7 +5426,7 @@
         <a:font script="Geor" typeface="Sylfaen"/>
       </a:majorFont>
       <a:minorFont>
-        <a:latin typeface="Century Gothic" panose="020B0502020202020204"/>
+        <a:latin typeface="Garamond" panose="02020404030301010803"/>
         <a:ea typeface=""/>
         <a:cs typeface=""/>
         <a:font script="Jpan" typeface="ＭＳ ゴシック"/>
@@ -5498,27 +5580,22 @@
           <a:gsLst>
             <a:gs pos="0">
               <a:schemeClr val="phClr">
-                <a:tint val="90000"/>
-                <a:shade val="92000"/>
-                <a:satMod val="160000"/>
-              </a:schemeClr>
-            </a:gs>
-            <a:gs pos="77000">
-              <a:schemeClr val="phClr">
-                <a:tint val="100000"/>
-                <a:shade val="73000"/>
-                <a:satMod val="155000"/>
+                <a:tint val="80000"/>
+                <a:shade val="100000"/>
+                <a:satMod val="300000"/>
               </a:schemeClr>
             </a:gs>
             <a:gs pos="100000">
               <a:schemeClr val="phClr">
                 <a:tint val="100000"/>
-                <a:shade val="67000"/>
-                <a:satMod val="145000"/>
+                <a:shade val="30000"/>
+                <a:satMod val="200000"/>
               </a:schemeClr>
             </a:gs>
           </a:gsLst>
-          <a:lin ang="5400000" scaled="0"/>
+          <a:path path="circle">
+            <a:fillToRect l="50000" t="50000" r="50000" b="50000"/>
+          </a:path>
         </a:gradFill>
         <a:blipFill rotWithShape="1">
           <a:blip xmlns:r="http://schemas.openxmlformats.org/officeDocument/2006/relationships" r:embed="rId1">
@@ -5541,7 +5618,7 @@
   <a:extraClrSchemeLst/>
   <a:extLst>
     <a:ext uri="{05A4C25C-085E-4340-85A3-A5531E510DB2}">
-      <thm15:themeFamily xmlns:thm15="http://schemas.microsoft.com/office/thememl/2012/main" name="Savon" id="{1306E473-ED32-493B-A2D0-240A757EDD34}" vid="{C20BADFE-D095-436F-9677-9264042809F0}"/>
+      <thm15:themeFamily xmlns:thm15="http://schemas.microsoft.com/office/thememl/2012/main" name="Savon" id="{1306E473-ED32-493B-A2D0-240A757EDD34}" vid="{3F20CFC1-E34F-405B-AA49-5BE0E194F1B3}"/>
     </a:ext>
   </a:extLst>
 </a:theme>

</xml_diff>